<commit_message>
added top pk tables
</commit_message>
<xml_diff>
--- a/paper_elements/diagrams.pptx
+++ b/paper_elements/diagrams.pptx
@@ -5,11 +5,12 @@
     <p:sldMasterId id="2147483648" r:id="rId1"/>
   </p:sldMasterIdLst>
   <p:notesMasterIdLst>
-    <p:notesMasterId r:id="rId4"/>
+    <p:notesMasterId r:id="rId5"/>
   </p:notesMasterIdLst>
   <p:sldIdLst>
     <p:sldId id="256" r:id="rId2"/>
     <p:sldId id="257" r:id="rId3"/>
+    <p:sldId id="258" r:id="rId4"/>
   </p:sldIdLst>
   <p:sldSz cx="12192000" cy="6858000"/>
   <p:notesSz cx="6858000" cy="9144000"/>
@@ -198,7 +199,7 @@
           <a:p>
             <a:fld id="{B362C91A-940B-1E4F-9193-1B428BBCD413}" type="datetimeFigureOut">
               <a:rPr lang="en-US" smtClean="0"/>
-              <a:t>4/26/25</a:t>
+              <a:t>5/1/25</a:t>
             </a:fld>
             <a:endParaRPr lang="en-US"/>
           </a:p>
@@ -696,7 +697,7 @@
           <a:p>
             <a:fld id="{3D263C57-0E3A-474A-99FA-CB3F9C0F1CD7}" type="datetimeFigureOut">
               <a:rPr lang="en-US" smtClean="0"/>
-              <a:t>4/26/25</a:t>
+              <a:t>5/1/25</a:t>
             </a:fld>
             <a:endParaRPr lang="en-US"/>
           </a:p>
@@ -894,7 +895,7 @@
           <a:p>
             <a:fld id="{3D263C57-0E3A-474A-99FA-CB3F9C0F1CD7}" type="datetimeFigureOut">
               <a:rPr lang="en-US" smtClean="0"/>
-              <a:t>4/26/25</a:t>
+              <a:t>5/1/25</a:t>
             </a:fld>
             <a:endParaRPr lang="en-US"/>
           </a:p>
@@ -1102,7 +1103,7 @@
           <a:p>
             <a:fld id="{3D263C57-0E3A-474A-99FA-CB3F9C0F1CD7}" type="datetimeFigureOut">
               <a:rPr lang="en-US" smtClean="0"/>
-              <a:t>4/26/25</a:t>
+              <a:t>5/1/25</a:t>
             </a:fld>
             <a:endParaRPr lang="en-US"/>
           </a:p>
@@ -1300,7 +1301,7 @@
           <a:p>
             <a:fld id="{3D263C57-0E3A-474A-99FA-CB3F9C0F1CD7}" type="datetimeFigureOut">
               <a:rPr lang="en-US" smtClean="0"/>
-              <a:t>4/26/25</a:t>
+              <a:t>5/1/25</a:t>
             </a:fld>
             <a:endParaRPr lang="en-US"/>
           </a:p>
@@ -1575,7 +1576,7 @@
           <a:p>
             <a:fld id="{3D263C57-0E3A-474A-99FA-CB3F9C0F1CD7}" type="datetimeFigureOut">
               <a:rPr lang="en-US" smtClean="0"/>
-              <a:t>4/26/25</a:t>
+              <a:t>5/1/25</a:t>
             </a:fld>
             <a:endParaRPr lang="en-US"/>
           </a:p>
@@ -1840,7 +1841,7 @@
           <a:p>
             <a:fld id="{3D263C57-0E3A-474A-99FA-CB3F9C0F1CD7}" type="datetimeFigureOut">
               <a:rPr lang="en-US" smtClean="0"/>
-              <a:t>4/26/25</a:t>
+              <a:t>5/1/25</a:t>
             </a:fld>
             <a:endParaRPr lang="en-US"/>
           </a:p>
@@ -2252,7 +2253,7 @@
           <a:p>
             <a:fld id="{3D263C57-0E3A-474A-99FA-CB3F9C0F1CD7}" type="datetimeFigureOut">
               <a:rPr lang="en-US" smtClean="0"/>
-              <a:t>4/26/25</a:t>
+              <a:t>5/1/25</a:t>
             </a:fld>
             <a:endParaRPr lang="en-US"/>
           </a:p>
@@ -2393,7 +2394,7 @@
           <a:p>
             <a:fld id="{3D263C57-0E3A-474A-99FA-CB3F9C0F1CD7}" type="datetimeFigureOut">
               <a:rPr lang="en-US" smtClean="0"/>
-              <a:t>4/26/25</a:t>
+              <a:t>5/1/25</a:t>
             </a:fld>
             <a:endParaRPr lang="en-US"/>
           </a:p>
@@ -2506,7 +2507,7 @@
           <a:p>
             <a:fld id="{3D263C57-0E3A-474A-99FA-CB3F9C0F1CD7}" type="datetimeFigureOut">
               <a:rPr lang="en-US" smtClean="0"/>
-              <a:t>4/26/25</a:t>
+              <a:t>5/1/25</a:t>
             </a:fld>
             <a:endParaRPr lang="en-US"/>
           </a:p>
@@ -2817,7 +2818,7 @@
           <a:p>
             <a:fld id="{3D263C57-0E3A-474A-99FA-CB3F9C0F1CD7}" type="datetimeFigureOut">
               <a:rPr lang="en-US" smtClean="0"/>
-              <a:t>4/26/25</a:t>
+              <a:t>5/1/25</a:t>
             </a:fld>
             <a:endParaRPr lang="en-US"/>
           </a:p>
@@ -3105,7 +3106,7 @@
           <a:p>
             <a:fld id="{3D263C57-0E3A-474A-99FA-CB3F9C0F1CD7}" type="datetimeFigureOut">
               <a:rPr lang="en-US" smtClean="0"/>
-              <a:t>4/26/25</a:t>
+              <a:t>5/1/25</a:t>
             </a:fld>
             <a:endParaRPr lang="en-US"/>
           </a:p>
@@ -3346,7 +3347,7 @@
           <a:p>
             <a:fld id="{3D263C57-0E3A-474A-99FA-CB3F9C0F1CD7}" type="datetimeFigureOut">
               <a:rPr lang="en-US" smtClean="0"/>
-              <a:t>4/26/25</a:t>
+              <a:t>5/1/25</a:t>
             </a:fld>
             <a:endParaRPr lang="en-US"/>
           </a:p>
@@ -7410,8 +7411,8 @@
                 </a:p>
               </p:txBody>
             </p:sp>
-            <mc:AlternateContent xmlns:mc="http://schemas.openxmlformats.org/markup-compatibility/2006">
-              <mc:Choice xmlns:a14="http://schemas.microsoft.com/office/drawing/2010/main" Requires="a14">
+            <mc:AlternateContent xmlns:mc="http://schemas.openxmlformats.org/markup-compatibility/2006" xmlns:a14="http://schemas.microsoft.com/office/drawing/2010/main">
+              <mc:Choice Requires="a14">
                 <p:sp>
                   <p:nvSpPr>
                     <p:cNvPr id="5" name="TextBox 4">
@@ -7497,7 +7498,7 @@
                   </p:txBody>
                 </p:sp>
               </mc:Choice>
-              <mc:Fallback>
+              <mc:Fallback xmlns="">
                 <p:sp>
                   <p:nvSpPr>
                     <p:cNvPr id="5" name="TextBox 4">
@@ -8975,6 +8976,2165 @@
 </p:sld>
 </file>
 
+<file path=ppt/slides/slide3.xml><?xml version="1.0" encoding="utf-8"?>
+<p:sld xmlns:a="http://schemas.openxmlformats.org/drawingml/2006/main" xmlns:r="http://schemas.openxmlformats.org/officeDocument/2006/relationships" xmlns:p="http://schemas.openxmlformats.org/presentationml/2006/main">
+  <p:cSld>
+    <p:spTree>
+      <p:nvGrpSpPr>
+        <p:cNvPr id="1" name=""/>
+        <p:cNvGrpSpPr/>
+        <p:nvPr/>
+      </p:nvGrpSpPr>
+      <p:grpSpPr>
+        <a:xfrm>
+          <a:off x="0" y="0"/>
+          <a:ext cx="0" cy="0"/>
+          <a:chOff x="0" y="0"/>
+          <a:chExt cx="0" cy="0"/>
+        </a:xfrm>
+      </p:grpSpPr>
+      <p:grpSp>
+        <p:nvGrpSpPr>
+          <p:cNvPr id="51" name="Group 50">
+            <a:extLst>
+              <a:ext uri="{FF2B5EF4-FFF2-40B4-BE49-F238E27FC236}">
+                <a16:creationId xmlns:a16="http://schemas.microsoft.com/office/drawing/2014/main" id="{D46BA243-69EE-8EE9-9AC5-01548611AE12}"/>
+              </a:ext>
+            </a:extLst>
+          </p:cNvPr>
+          <p:cNvGrpSpPr/>
+          <p:nvPr/>
+        </p:nvGrpSpPr>
+        <p:grpSpPr>
+          <a:xfrm>
+            <a:off x="1471479" y="3205401"/>
+            <a:ext cx="1861275" cy="892674"/>
+            <a:chOff x="5917842" y="1252534"/>
+            <a:chExt cx="2801472" cy="966444"/>
+          </a:xfrm>
+        </p:grpSpPr>
+        <p:sp>
+          <p:nvSpPr>
+            <p:cNvPr id="92" name="Rectangle 91">
+              <a:extLst>
+                <a:ext uri="{FF2B5EF4-FFF2-40B4-BE49-F238E27FC236}">
+                  <a16:creationId xmlns:a16="http://schemas.microsoft.com/office/drawing/2014/main" id="{5CC2913A-843E-FC72-D74C-78650AC2C8B7}"/>
+                </a:ext>
+              </a:extLst>
+            </p:cNvPr>
+            <p:cNvSpPr/>
+            <p:nvPr/>
+          </p:nvSpPr>
+          <p:spPr>
+            <a:xfrm>
+              <a:off x="5917844" y="1252534"/>
+              <a:ext cx="2801470" cy="966444"/>
+            </a:xfrm>
+            <a:prstGeom prst="rect">
+              <a:avLst/>
+            </a:prstGeom>
+            <a:solidFill>
+              <a:schemeClr val="bg1">
+                <a:lumMod val="85000"/>
+              </a:schemeClr>
+            </a:solidFill>
+          </p:spPr>
+          <p:style>
+            <a:lnRef idx="2">
+              <a:schemeClr val="accent1">
+                <a:shade val="15000"/>
+              </a:schemeClr>
+            </a:lnRef>
+            <a:fillRef idx="1">
+              <a:schemeClr val="accent1"/>
+            </a:fillRef>
+            <a:effectRef idx="0">
+              <a:schemeClr val="accent1"/>
+            </a:effectRef>
+            <a:fontRef idx="minor">
+              <a:schemeClr val="lt1"/>
+            </a:fontRef>
+          </p:style>
+          <p:txBody>
+            <a:bodyPr rtlCol="0" anchor="ctr"/>
+            <a:lstStyle/>
+            <a:p>
+              <a:pPr algn="ctr"/>
+              <a:endParaRPr lang="en-US" sz="1600"/>
+            </a:p>
+          </p:txBody>
+        </p:sp>
+        <p:sp>
+          <p:nvSpPr>
+            <p:cNvPr id="93" name="TextBox 92">
+              <a:extLst>
+                <a:ext uri="{FF2B5EF4-FFF2-40B4-BE49-F238E27FC236}">
+                  <a16:creationId xmlns:a16="http://schemas.microsoft.com/office/drawing/2014/main" id="{23934092-417A-E2A3-282D-83CF0521D968}"/>
+                </a:ext>
+              </a:extLst>
+            </p:cNvPr>
+            <p:cNvSpPr txBox="1"/>
+            <p:nvPr/>
+          </p:nvSpPr>
+          <p:spPr>
+            <a:xfrm>
+              <a:off x="5980661" y="1265858"/>
+              <a:ext cx="2714522" cy="366532"/>
+            </a:xfrm>
+            <a:prstGeom prst="rect">
+              <a:avLst/>
+            </a:prstGeom>
+            <a:noFill/>
+          </p:spPr>
+          <p:txBody>
+            <a:bodyPr wrap="square" rtlCol="0">
+              <a:spAutoFit/>
+            </a:bodyPr>
+            <a:lstStyle/>
+            <a:p>
+              <a:pPr algn="ctr"/>
+              <a:r>
+                <a:rPr lang="en-US" sz="1600" dirty="0">
+                  <a:latin typeface="Helvetica" pitchFamily="2" charset="0"/>
+                </a:rPr>
+                <a:t>0-shot baselines</a:t>
+              </a:r>
+            </a:p>
+          </p:txBody>
+        </p:sp>
+        <mc:AlternateContent xmlns:mc="http://schemas.openxmlformats.org/markup-compatibility/2006">
+          <mc:Choice xmlns:a14="http://schemas.microsoft.com/office/drawing/2010/main" Requires="a14">
+            <p:sp>
+              <p:nvSpPr>
+                <p:cNvPr id="94" name="TextBox 93">
+                  <a:extLst>
+                    <a:ext uri="{FF2B5EF4-FFF2-40B4-BE49-F238E27FC236}">
+                      <a16:creationId xmlns:a16="http://schemas.microsoft.com/office/drawing/2014/main" id="{399272A2-8C7D-C87A-6BBA-042DBE56697A}"/>
+                    </a:ext>
+                  </a:extLst>
+                </p:cNvPr>
+                <p:cNvSpPr txBox="1"/>
+                <p:nvPr/>
+              </p:nvSpPr>
+              <p:spPr>
+                <a:xfrm>
+                  <a:off x="6047717" y="1643516"/>
+                  <a:ext cx="2671597" cy="566458"/>
+                </a:xfrm>
+                <a:prstGeom prst="rect">
+                  <a:avLst/>
+                </a:prstGeom>
+                <a:noFill/>
+              </p:spPr>
+              <p:txBody>
+                <a:bodyPr wrap="square" rtlCol="0">
+                  <a:spAutoFit/>
+                </a:bodyPr>
+                <a:lstStyle/>
+                <a:p>
+                  <a:pPr algn="ctr"/>
+                  <a14:m>
+                    <m:oMath xmlns:m="http://schemas.openxmlformats.org/officeDocument/2006/math">
+                      <m:func>
+                        <m:funcPr>
+                          <m:ctrlPr>
+                            <a:rPr lang="en-US" sz="1400" i="1" smtClean="0">
+                              <a:latin typeface="Cambria Math" panose="02040503050406030204" pitchFamily="18" charset="0"/>
+                            </a:rPr>
+                          </m:ctrlPr>
+                        </m:funcPr>
+                        <m:fName>
+                          <m:r>
+                            <m:rPr>
+                              <m:sty m:val="p"/>
+                            </m:rPr>
+                            <a:rPr lang="en-US" sz="1400" i="0" smtClean="0">
+                              <a:latin typeface="Cambria Math" panose="02040503050406030204" pitchFamily="18" charset="0"/>
+                            </a:rPr>
+                            <m:t>log</m:t>
+                          </m:r>
+                        </m:fName>
+                        <m:e>
+                          <m:r>
+                            <a:rPr lang="en-US" sz="1400" b="0" i="1" smtClean="0">
+                              <a:latin typeface="Cambria Math" panose="02040503050406030204" pitchFamily="18" charset="0"/>
+                            </a:rPr>
+                            <m:t>𝑝</m:t>
+                          </m:r>
+                        </m:e>
+                      </m:func>
+                      <m:d>
+                        <m:dPr>
+                          <m:ctrlPr>
+                            <a:rPr lang="en-US" sz="1400" i="1" smtClean="0">
+                              <a:latin typeface="Cambria Math" panose="02040503050406030204" pitchFamily="18" charset="0"/>
+                            </a:rPr>
+                          </m:ctrlPr>
+                        </m:dPr>
+                        <m:e>
+                          <m:r>
+                            <a:rPr lang="en-US" sz="1400" b="1" i="1" smtClean="0">
+                              <a:latin typeface="Cambria Math" panose="02040503050406030204" pitchFamily="18" charset="0"/>
+                            </a:rPr>
+                            <m:t>𝒙</m:t>
+                          </m:r>
+                        </m:e>
+                      </m:d>
+                      <m:r>
+                        <a:rPr lang="en-US" sz="1400" b="0" i="0" smtClean="0">
+                          <a:latin typeface="Cambria Math" panose="02040503050406030204" pitchFamily="18" charset="0"/>
+                        </a:rPr>
+                        <m:t>, </m:t>
+                      </m:r>
+                    </m:oMath>
+                  </a14:m>
+                  <a:r>
+                    <a:rPr lang="en-US" sz="1400" dirty="0">
+                      <a:latin typeface="Helvetica" pitchFamily="2" charset="0"/>
+                    </a:rPr>
+                    <a:t>Rank, </a:t>
+                  </a:r>
+                  <a:r>
+                    <a:rPr lang="en-US" sz="1400" dirty="0" err="1">
+                      <a:latin typeface="Helvetica" pitchFamily="2" charset="0"/>
+                    </a:rPr>
+                    <a:t>LogRank</a:t>
+                  </a:r>
+                  <a:r>
+                    <a:rPr lang="en-US" sz="1400" dirty="0">
+                      <a:latin typeface="Helvetica" pitchFamily="2" charset="0"/>
+                    </a:rPr>
+                    <a:t>, Entropy</a:t>
+                  </a:r>
+                </a:p>
+              </p:txBody>
+            </p:sp>
+          </mc:Choice>
+          <mc:Fallback>
+            <p:sp>
+              <p:nvSpPr>
+                <p:cNvPr id="94" name="TextBox 93">
+                  <a:extLst>
+                    <a:ext uri="{FF2B5EF4-FFF2-40B4-BE49-F238E27FC236}">
+                      <a16:creationId xmlns:a16="http://schemas.microsoft.com/office/drawing/2014/main" id="{399272A2-8C7D-C87A-6BBA-042DBE56697A}"/>
+                    </a:ext>
+                  </a:extLst>
+                </p:cNvPr>
+                <p:cNvSpPr txBox="1">
+                  <a:spLocks noRot="1" noChangeAspect="1" noMove="1" noResize="1" noEditPoints="1" noAdjustHandles="1" noChangeArrowheads="1" noChangeShapeType="1" noTextEdit="1"/>
+                </p:cNvSpPr>
+                <p:nvPr/>
+              </p:nvSpPr>
+              <p:spPr>
+                <a:xfrm>
+                  <a:off x="6047717" y="1643516"/>
+                  <a:ext cx="2671597" cy="566458"/>
+                </a:xfrm>
+                <a:prstGeom prst="rect">
+                  <a:avLst/>
+                </a:prstGeom>
+                <a:blipFill>
+                  <a:blip r:embed="rId2"/>
+                  <a:stretch>
+                    <a:fillRect t="-2326" b="-11628"/>
+                  </a:stretch>
+                </a:blipFill>
+              </p:spPr>
+              <p:txBody>
+                <a:bodyPr/>
+                <a:lstStyle/>
+                <a:p>
+                  <a:r>
+                    <a:rPr lang="en-US">
+                      <a:noFill/>
+                    </a:rPr>
+                    <a:t> </a:t>
+                  </a:r>
+                </a:p>
+              </p:txBody>
+            </p:sp>
+          </mc:Fallback>
+        </mc:AlternateContent>
+        <p:cxnSp>
+          <p:nvCxnSpPr>
+            <p:cNvPr id="95" name="Straight Connector 94">
+              <a:extLst>
+                <a:ext uri="{FF2B5EF4-FFF2-40B4-BE49-F238E27FC236}">
+                  <a16:creationId xmlns:a16="http://schemas.microsoft.com/office/drawing/2014/main" id="{AA044DE4-4FAA-B63A-6B8A-BEFB9455D74C}"/>
+                </a:ext>
+              </a:extLst>
+            </p:cNvPr>
+            <p:cNvCxnSpPr>
+              <a:cxnSpLocks/>
+            </p:cNvCxnSpPr>
+            <p:nvPr/>
+          </p:nvCxnSpPr>
+          <p:spPr>
+            <a:xfrm flipV="1">
+              <a:off x="5917842" y="1624410"/>
+              <a:ext cx="2801471" cy="10104"/>
+            </a:xfrm>
+            <a:prstGeom prst="line">
+              <a:avLst/>
+            </a:prstGeom>
+            <a:ln>
+              <a:solidFill>
+                <a:schemeClr val="tx1">
+                  <a:lumMod val="65000"/>
+                  <a:lumOff val="35000"/>
+                </a:schemeClr>
+              </a:solidFill>
+            </a:ln>
+          </p:spPr>
+          <p:style>
+            <a:lnRef idx="2">
+              <a:schemeClr val="accent3"/>
+            </a:lnRef>
+            <a:fillRef idx="0">
+              <a:schemeClr val="accent3"/>
+            </a:fillRef>
+            <a:effectRef idx="1">
+              <a:schemeClr val="accent3"/>
+            </a:effectRef>
+            <a:fontRef idx="minor">
+              <a:schemeClr val="tx1"/>
+            </a:fontRef>
+          </p:style>
+        </p:cxnSp>
+      </p:grpSp>
+      <mc:AlternateContent xmlns:mc="http://schemas.openxmlformats.org/markup-compatibility/2006">
+        <mc:Choice xmlns:a14="http://schemas.microsoft.com/office/drawing/2010/main" Requires="a14">
+          <p:sp>
+            <p:nvSpPr>
+              <p:cNvPr id="90" name="Rectangle 89">
+                <a:extLst>
+                  <a:ext uri="{FF2B5EF4-FFF2-40B4-BE49-F238E27FC236}">
+                    <a16:creationId xmlns:a16="http://schemas.microsoft.com/office/drawing/2014/main" id="{7C5A07E3-FC9E-1A5A-5BFA-F9D596F28C6B}"/>
+                  </a:ext>
+                </a:extLst>
+              </p:cNvPr>
+              <p:cNvSpPr/>
+              <p:nvPr/>
+            </p:nvSpPr>
+            <p:spPr>
+              <a:xfrm>
+                <a:off x="3507847" y="707055"/>
+                <a:ext cx="1399227" cy="806096"/>
+              </a:xfrm>
+              <a:prstGeom prst="rect">
+                <a:avLst/>
+              </a:prstGeom>
+              <a:solidFill>
+                <a:schemeClr val="accent2">
+                  <a:lumMod val="40000"/>
+                  <a:lumOff val="60000"/>
+                </a:schemeClr>
+              </a:solidFill>
+            </p:spPr>
+            <p:style>
+              <a:lnRef idx="2">
+                <a:schemeClr val="accent1">
+                  <a:shade val="15000"/>
+                </a:schemeClr>
+              </a:lnRef>
+              <a:fillRef idx="1">
+                <a:schemeClr val="accent1"/>
+              </a:fillRef>
+              <a:effectRef idx="0">
+                <a:schemeClr val="accent1"/>
+              </a:effectRef>
+              <a:fontRef idx="minor">
+                <a:schemeClr val="lt1"/>
+              </a:fontRef>
+            </p:style>
+            <p:txBody>
+              <a:bodyPr rtlCol="0" anchor="ctr"/>
+              <a:lstStyle/>
+              <a:p>
+                <a:pPr algn="ctr"/>
+                <a:r>
+                  <a:rPr lang="en-US" sz="1600" dirty="0">
+                    <a:solidFill>
+                      <a:schemeClr val="tx1"/>
+                    </a:solidFill>
+                  </a:rPr>
+                  <a:t>Generator</a:t>
+                </a:r>
+              </a:p>
+              <a:p>
+                <a:pPr algn="ctr"/>
+                <a:r>
+                  <a:rPr lang="en-US" sz="1600" dirty="0">
+                    <a:solidFill>
+                      <a:schemeClr val="tx1"/>
+                    </a:solidFill>
+                  </a:rPr>
+                  <a:t>model </a:t>
+                </a:r>
+                <a14:m>
+                  <m:oMath xmlns:m="http://schemas.openxmlformats.org/officeDocument/2006/math">
+                    <m:sSub>
+                      <m:sSubPr>
+                        <m:ctrlPr>
+                          <a:rPr lang="en-US" sz="1600" i="1" smtClean="0">
+                            <a:solidFill>
+                              <a:schemeClr val="tx1"/>
+                            </a:solidFill>
+                            <a:latin typeface="Cambria Math" panose="02040503050406030204" pitchFamily="18" charset="0"/>
+                          </a:rPr>
+                        </m:ctrlPr>
+                      </m:sSubPr>
+                      <m:e>
+                        <m:r>
+                          <a:rPr lang="en-US" sz="1600" b="0" i="1" smtClean="0">
+                            <a:solidFill>
+                              <a:schemeClr val="tx1"/>
+                            </a:solidFill>
+                            <a:latin typeface="Cambria Math" panose="02040503050406030204" pitchFamily="18" charset="0"/>
+                          </a:rPr>
+                          <m:t>𝑃</m:t>
+                        </m:r>
+                      </m:e>
+                      <m:sub>
+                        <m:r>
+                          <a:rPr lang="el-GR" sz="1600" b="0" i="1" smtClean="0">
+                            <a:solidFill>
+                              <a:schemeClr val="tx1"/>
+                            </a:solidFill>
+                            <a:latin typeface="Cambria Math" panose="02040503050406030204" pitchFamily="18" charset="0"/>
+                          </a:rPr>
+                          <m:t>𝜃</m:t>
+                        </m:r>
+                      </m:sub>
+                    </m:sSub>
+                  </m:oMath>
+                </a14:m>
+                <a:endParaRPr lang="en-US" sz="1600" dirty="0">
+                  <a:solidFill>
+                    <a:schemeClr val="tx1"/>
+                  </a:solidFill>
+                </a:endParaRPr>
+              </a:p>
+            </p:txBody>
+          </p:sp>
+        </mc:Choice>
+        <mc:Fallback>
+          <p:sp>
+            <p:nvSpPr>
+              <p:cNvPr id="90" name="Rectangle 89">
+                <a:extLst>
+                  <a:ext uri="{FF2B5EF4-FFF2-40B4-BE49-F238E27FC236}">
+                    <a16:creationId xmlns:a16="http://schemas.microsoft.com/office/drawing/2014/main" id="{7C5A07E3-FC9E-1A5A-5BFA-F9D596F28C6B}"/>
+                  </a:ext>
+                </a:extLst>
+              </p:cNvPr>
+              <p:cNvSpPr>
+                <a:spLocks noRot="1" noChangeAspect="1" noMove="1" noResize="1" noEditPoints="1" noAdjustHandles="1" noChangeArrowheads="1" noChangeShapeType="1" noTextEdit="1"/>
+              </p:cNvSpPr>
+              <p:nvPr/>
+            </p:nvSpPr>
+            <p:spPr>
+              <a:xfrm>
+                <a:off x="3507847" y="707055"/>
+                <a:ext cx="1399227" cy="806096"/>
+              </a:xfrm>
+              <a:prstGeom prst="rect">
+                <a:avLst/>
+              </a:prstGeom>
+              <a:blipFill>
+                <a:blip r:embed="rId3"/>
+                <a:stretch>
+                  <a:fillRect/>
+                </a:stretch>
+              </a:blipFill>
+            </p:spPr>
+            <p:txBody>
+              <a:bodyPr/>
+              <a:lstStyle/>
+              <a:p>
+                <a:r>
+                  <a:rPr lang="en-US">
+                    <a:noFill/>
+                  </a:rPr>
+                  <a:t> </a:t>
+                </a:r>
+              </a:p>
+            </p:txBody>
+          </p:sp>
+        </mc:Fallback>
+      </mc:AlternateContent>
+      <mc:AlternateContent xmlns:mc="http://schemas.openxmlformats.org/markup-compatibility/2006">
+        <mc:Choice xmlns:a14="http://schemas.microsoft.com/office/drawing/2010/main" Requires="a14">
+          <p:sp>
+            <p:nvSpPr>
+              <p:cNvPr id="88" name="Rectangle 87">
+                <a:extLst>
+                  <a:ext uri="{FF2B5EF4-FFF2-40B4-BE49-F238E27FC236}">
+                    <a16:creationId xmlns:a16="http://schemas.microsoft.com/office/drawing/2014/main" id="{C4478B9C-F28E-683D-E174-060BE6B4BBE4}"/>
+                  </a:ext>
+                </a:extLst>
+              </p:cNvPr>
+              <p:cNvSpPr/>
+              <p:nvPr/>
+            </p:nvSpPr>
+            <p:spPr>
+              <a:xfrm>
+                <a:off x="3412136" y="3205402"/>
+                <a:ext cx="1560219" cy="892673"/>
+              </a:xfrm>
+              <a:prstGeom prst="rect">
+                <a:avLst/>
+              </a:prstGeom>
+              <a:solidFill>
+                <a:schemeClr val="accent6">
+                  <a:lumMod val="20000"/>
+                  <a:lumOff val="80000"/>
+                </a:schemeClr>
+              </a:solidFill>
+            </p:spPr>
+            <p:style>
+              <a:lnRef idx="2">
+                <a:schemeClr val="accent1">
+                  <a:shade val="15000"/>
+                </a:schemeClr>
+              </a:lnRef>
+              <a:fillRef idx="1">
+                <a:schemeClr val="accent1"/>
+              </a:fillRef>
+              <a:effectRef idx="0">
+                <a:schemeClr val="accent1"/>
+              </a:effectRef>
+              <a:fontRef idx="minor">
+                <a:schemeClr val="lt1"/>
+              </a:fontRef>
+            </p:style>
+            <p:txBody>
+              <a:bodyPr rtlCol="0" anchor="ctr"/>
+              <a:lstStyle/>
+              <a:p>
+                <a:pPr algn="ctr"/>
+                <a:r>
+                  <a:rPr lang="en-US" sz="1600" dirty="0">
+                    <a:solidFill>
+                      <a:schemeClr val="tx1"/>
+                    </a:solidFill>
+                    <a:latin typeface="Helvetica" pitchFamily="2" charset="0"/>
+                  </a:rPr>
+                  <a:t>DetectGPT</a:t>
+                </a:r>
+              </a:p>
+              <a:p>
+                <a:pPr algn="ctr"/>
+                <a:r>
+                  <a:rPr lang="en-US" sz="1400" dirty="0">
+                    <a:solidFill>
+                      <a:schemeClr val="tx1"/>
+                    </a:solidFill>
+                    <a:latin typeface="Helvetica" pitchFamily="2" charset="0"/>
+                  </a:rPr>
+                  <a:t>(scoring</a:t>
+                </a:r>
+              </a:p>
+              <a:p>
+                <a:pPr algn="ctr"/>
+                <a:r>
+                  <a:rPr lang="en-US" sz="1400" dirty="0">
+                    <a:solidFill>
+                      <a:schemeClr val="tx1"/>
+                    </a:solidFill>
+                    <a:latin typeface="Helvetica" pitchFamily="2" charset="0"/>
+                  </a:rPr>
+                  <a:t>model </a:t>
+                </a:r>
+                <a14:m>
+                  <m:oMath xmlns:m="http://schemas.openxmlformats.org/officeDocument/2006/math">
+                    <m:sSub>
+                      <m:sSubPr>
+                        <m:ctrlPr>
+                          <a:rPr lang="en-US" sz="1400" i="1" smtClean="0">
+                            <a:solidFill>
+                              <a:schemeClr val="tx1"/>
+                            </a:solidFill>
+                            <a:latin typeface="Cambria Math" panose="02040503050406030204" pitchFamily="18" charset="0"/>
+                          </a:rPr>
+                        </m:ctrlPr>
+                      </m:sSubPr>
+                      <m:e>
+                        <m:r>
+                          <a:rPr lang="en-US" sz="1400" b="0" i="1" smtClean="0">
+                            <a:solidFill>
+                              <a:schemeClr val="tx1"/>
+                            </a:solidFill>
+                            <a:latin typeface="Cambria Math" panose="02040503050406030204" pitchFamily="18" charset="0"/>
+                          </a:rPr>
+                          <m:t>𝑝</m:t>
+                        </m:r>
+                      </m:e>
+                      <m:sub>
+                        <m:r>
+                          <a:rPr lang="el-GR" sz="1400" b="0" i="1" smtClean="0">
+                            <a:solidFill>
+                              <a:schemeClr val="tx1"/>
+                            </a:solidFill>
+                            <a:latin typeface="Cambria Math" panose="02040503050406030204" pitchFamily="18" charset="0"/>
+                          </a:rPr>
+                          <m:t>𝜃</m:t>
+                        </m:r>
+                      </m:sub>
+                    </m:sSub>
+                  </m:oMath>
+                </a14:m>
+                <a:r>
+                  <a:rPr lang="en-US" sz="1400" dirty="0">
+                    <a:solidFill>
+                      <a:schemeClr val="tx1"/>
+                    </a:solidFill>
+                    <a:latin typeface="Helvetica" pitchFamily="2" charset="0"/>
+                  </a:rPr>
+                  <a:t>)</a:t>
+                </a:r>
+              </a:p>
+            </p:txBody>
+          </p:sp>
+        </mc:Choice>
+        <mc:Fallback>
+          <p:sp>
+            <p:nvSpPr>
+              <p:cNvPr id="88" name="Rectangle 87">
+                <a:extLst>
+                  <a:ext uri="{FF2B5EF4-FFF2-40B4-BE49-F238E27FC236}">
+                    <a16:creationId xmlns:a16="http://schemas.microsoft.com/office/drawing/2014/main" id="{C4478B9C-F28E-683D-E174-060BE6B4BBE4}"/>
+                  </a:ext>
+                </a:extLst>
+              </p:cNvPr>
+              <p:cNvSpPr>
+                <a:spLocks noRot="1" noChangeAspect="1" noMove="1" noResize="1" noEditPoints="1" noAdjustHandles="1" noChangeArrowheads="1" noChangeShapeType="1" noTextEdit="1"/>
+              </p:cNvSpPr>
+              <p:nvPr/>
+            </p:nvSpPr>
+            <p:spPr>
+              <a:xfrm>
+                <a:off x="3412136" y="3205402"/>
+                <a:ext cx="1560219" cy="892673"/>
+              </a:xfrm>
+              <a:prstGeom prst="rect">
+                <a:avLst/>
+              </a:prstGeom>
+              <a:blipFill>
+                <a:blip r:embed="rId4"/>
+                <a:stretch>
+                  <a:fillRect/>
+                </a:stretch>
+              </a:blipFill>
+            </p:spPr>
+            <p:txBody>
+              <a:bodyPr/>
+              <a:lstStyle/>
+              <a:p>
+                <a:r>
+                  <a:rPr lang="en-US">
+                    <a:noFill/>
+                  </a:rPr>
+                  <a:t> </a:t>
+                </a:r>
+              </a:p>
+            </p:txBody>
+          </p:sp>
+        </mc:Fallback>
+      </mc:AlternateContent>
+      <p:grpSp>
+        <p:nvGrpSpPr>
+          <p:cNvPr id="80" name="Group 79">
+            <a:extLst>
+              <a:ext uri="{FF2B5EF4-FFF2-40B4-BE49-F238E27FC236}">
+                <a16:creationId xmlns:a16="http://schemas.microsoft.com/office/drawing/2014/main" id="{42B0EF23-D7A2-F2E6-2A38-69886470652D}"/>
+              </a:ext>
+            </a:extLst>
+          </p:cNvPr>
+          <p:cNvGrpSpPr/>
+          <p:nvPr/>
+        </p:nvGrpSpPr>
+        <p:grpSpPr>
+          <a:xfrm>
+            <a:off x="1512239" y="707055"/>
+            <a:ext cx="1692718" cy="806097"/>
+            <a:chOff x="1889062" y="1941767"/>
+            <a:chExt cx="2195856" cy="761953"/>
+          </a:xfrm>
+        </p:grpSpPr>
+        <p:sp>
+          <p:nvSpPr>
+            <p:cNvPr id="83" name="Rectangle 82">
+              <a:extLst>
+                <a:ext uri="{FF2B5EF4-FFF2-40B4-BE49-F238E27FC236}">
+                  <a16:creationId xmlns:a16="http://schemas.microsoft.com/office/drawing/2014/main" id="{1453FE3A-5CE9-3E83-EC6A-57165806F844}"/>
+                </a:ext>
+              </a:extLst>
+            </p:cNvPr>
+            <p:cNvSpPr/>
+            <p:nvPr/>
+          </p:nvSpPr>
+          <p:spPr>
+            <a:xfrm>
+              <a:off x="1889070" y="1941767"/>
+              <a:ext cx="2195848" cy="761953"/>
+            </a:xfrm>
+            <a:prstGeom prst="rect">
+              <a:avLst/>
+            </a:prstGeom>
+            <a:solidFill>
+              <a:schemeClr val="tx2">
+                <a:lumMod val="25000"/>
+                <a:lumOff val="75000"/>
+              </a:schemeClr>
+            </a:solidFill>
+          </p:spPr>
+          <p:style>
+            <a:lnRef idx="2">
+              <a:schemeClr val="accent1">
+                <a:shade val="15000"/>
+              </a:schemeClr>
+            </a:lnRef>
+            <a:fillRef idx="1">
+              <a:schemeClr val="accent1"/>
+            </a:fillRef>
+            <a:effectRef idx="0">
+              <a:schemeClr val="accent1"/>
+            </a:effectRef>
+            <a:fontRef idx="minor">
+              <a:schemeClr val="lt1"/>
+            </a:fontRef>
+          </p:style>
+          <p:txBody>
+            <a:bodyPr rtlCol="0" anchor="ctr"/>
+            <a:lstStyle/>
+            <a:p>
+              <a:pPr algn="ctr"/>
+              <a:endParaRPr lang="en-US"/>
+            </a:p>
+          </p:txBody>
+        </p:sp>
+        <p:sp>
+          <p:nvSpPr>
+            <p:cNvPr id="84" name="TextBox 83">
+              <a:extLst>
+                <a:ext uri="{FF2B5EF4-FFF2-40B4-BE49-F238E27FC236}">
+                  <a16:creationId xmlns:a16="http://schemas.microsoft.com/office/drawing/2014/main" id="{87B656DD-E4DB-6528-14CF-0D132C646592}"/>
+                </a:ext>
+              </a:extLst>
+            </p:cNvPr>
+            <p:cNvSpPr txBox="1"/>
+            <p:nvPr/>
+          </p:nvSpPr>
+          <p:spPr>
+            <a:xfrm>
+              <a:off x="3519153" y="1960808"/>
+              <a:ext cx="65" cy="276999"/>
+            </a:xfrm>
+            <a:prstGeom prst="rect">
+              <a:avLst/>
+            </a:prstGeom>
+            <a:noFill/>
+          </p:spPr>
+          <p:txBody>
+            <a:bodyPr wrap="none" lIns="0" tIns="0" rIns="0" bIns="0" rtlCol="0">
+              <a:spAutoFit/>
+            </a:bodyPr>
+            <a:lstStyle/>
+            <a:p>
+              <a:endParaRPr lang="en-US" dirty="0"/>
+            </a:p>
+          </p:txBody>
+        </p:sp>
+        <p:sp>
+          <p:nvSpPr>
+            <p:cNvPr id="85" name="TextBox 84">
+              <a:extLst>
+                <a:ext uri="{FF2B5EF4-FFF2-40B4-BE49-F238E27FC236}">
+                  <a16:creationId xmlns:a16="http://schemas.microsoft.com/office/drawing/2014/main" id="{EEE68ED4-4252-50E9-BFA4-F38FD96DFD31}"/>
+                </a:ext>
+              </a:extLst>
+            </p:cNvPr>
+            <p:cNvSpPr txBox="1"/>
+            <p:nvPr/>
+          </p:nvSpPr>
+          <p:spPr>
+            <a:xfrm>
+              <a:off x="1913638" y="1943419"/>
+              <a:ext cx="2146694" cy="320014"/>
+            </a:xfrm>
+            <a:prstGeom prst="rect">
+              <a:avLst/>
+            </a:prstGeom>
+            <a:noFill/>
+          </p:spPr>
+          <p:txBody>
+            <a:bodyPr wrap="square" rtlCol="0">
+              <a:spAutoFit/>
+            </a:bodyPr>
+            <a:lstStyle/>
+            <a:p>
+              <a:pPr algn="ctr"/>
+              <a:r>
+                <a:rPr lang="en-US" sz="1600" dirty="0">
+                  <a:latin typeface="Helvetica" pitchFamily="2" charset="0"/>
+                </a:rPr>
+                <a:t>Corpus</a:t>
+              </a:r>
+              <a:endParaRPr lang="en-US" dirty="0">
+                <a:latin typeface="Helvetica" pitchFamily="2" charset="0"/>
+              </a:endParaRPr>
+            </a:p>
+          </p:txBody>
+        </p:sp>
+        <mc:AlternateContent xmlns:mc="http://schemas.openxmlformats.org/markup-compatibility/2006">
+          <mc:Choice xmlns:a14="http://schemas.microsoft.com/office/drawing/2010/main" Requires="a14">
+            <p:sp>
+              <p:nvSpPr>
+                <p:cNvPr id="86" name="TextBox 85">
+                  <a:extLst>
+                    <a:ext uri="{FF2B5EF4-FFF2-40B4-BE49-F238E27FC236}">
+                      <a16:creationId xmlns:a16="http://schemas.microsoft.com/office/drawing/2014/main" id="{2FA44ED9-8607-C8C0-F299-77CBD1F1A542}"/>
+                    </a:ext>
+                  </a:extLst>
+                </p:cNvPr>
+                <p:cNvSpPr txBox="1"/>
+                <p:nvPr/>
+              </p:nvSpPr>
+              <p:spPr>
+                <a:xfrm>
+                  <a:off x="1889062" y="2342914"/>
+                  <a:ext cx="2195848" cy="299347"/>
+                </a:xfrm>
+                <a:prstGeom prst="rect">
+                  <a:avLst/>
+                </a:prstGeom>
+                <a:noFill/>
+              </p:spPr>
+              <p:txBody>
+                <a:bodyPr wrap="square" rtlCol="0">
+                  <a:spAutoFit/>
+                </a:bodyPr>
+                <a:lstStyle/>
+                <a:p>
+                  <a:pPr algn="ctr"/>
+                  <a:r>
+                    <a:rPr lang="en-US" sz="1400" dirty="0">
+                      <a:latin typeface="Helvetica" pitchFamily="2" charset="0"/>
+                    </a:rPr>
+                    <a:t>human-written</a:t>
+                  </a:r>
+                  <a:r>
+                    <a:rPr lang="en-US" sz="1400" dirty="0"/>
+                    <a:t> </a:t>
+                  </a:r>
+                  <a14:m>
+                    <m:oMath xmlns:m="http://schemas.openxmlformats.org/officeDocument/2006/math">
+                      <m:sSup>
+                        <m:sSupPr>
+                          <m:ctrlPr>
+                            <a:rPr lang="en-US" sz="1400" i="1" smtClean="0">
+                              <a:latin typeface="Cambria Math" panose="02040503050406030204" pitchFamily="18" charset="0"/>
+                            </a:rPr>
+                          </m:ctrlPr>
+                        </m:sSupPr>
+                        <m:e>
+                          <m:r>
+                            <a:rPr lang="en-US" sz="1400" b="1" i="1" smtClean="0">
+                              <a:latin typeface="Cambria Math" panose="02040503050406030204" pitchFamily="18" charset="0"/>
+                            </a:rPr>
+                            <m:t>𝒙</m:t>
+                          </m:r>
+                        </m:e>
+                        <m:sup>
+                          <m:r>
+                            <a:rPr lang="en-US" sz="1400" b="0" i="1" smtClean="0">
+                              <a:latin typeface="Cambria Math" panose="02040503050406030204" pitchFamily="18" charset="0"/>
+                            </a:rPr>
+                            <m:t>(</m:t>
+                          </m:r>
+                          <m:r>
+                            <a:rPr lang="en-US" sz="1400" b="0" i="1" smtClean="0">
+                              <a:latin typeface="Cambria Math" panose="02040503050406030204" pitchFamily="18" charset="0"/>
+                            </a:rPr>
+                            <m:t>𝑖</m:t>
+                          </m:r>
+                          <m:r>
+                            <a:rPr lang="en-US" sz="1400" b="0" i="1" smtClean="0">
+                              <a:latin typeface="Cambria Math" panose="02040503050406030204" pitchFamily="18" charset="0"/>
+                            </a:rPr>
+                            <m:t>)</m:t>
+                          </m:r>
+                        </m:sup>
+                      </m:sSup>
+                    </m:oMath>
+                  </a14:m>
+                  <a:endParaRPr lang="en-US" sz="1400" b="1" dirty="0"/>
+                </a:p>
+              </p:txBody>
+            </p:sp>
+          </mc:Choice>
+          <mc:Fallback>
+            <p:sp>
+              <p:nvSpPr>
+                <p:cNvPr id="86" name="TextBox 85">
+                  <a:extLst>
+                    <a:ext uri="{FF2B5EF4-FFF2-40B4-BE49-F238E27FC236}">
+                      <a16:creationId xmlns:a16="http://schemas.microsoft.com/office/drawing/2014/main" id="{2FA44ED9-8607-C8C0-F299-77CBD1F1A542}"/>
+                    </a:ext>
+                  </a:extLst>
+                </p:cNvPr>
+                <p:cNvSpPr txBox="1">
+                  <a:spLocks noRot="1" noChangeAspect="1" noMove="1" noResize="1" noEditPoints="1" noAdjustHandles="1" noChangeArrowheads="1" noChangeShapeType="1" noTextEdit="1"/>
+                </p:cNvSpPr>
+                <p:nvPr/>
+              </p:nvSpPr>
+              <p:spPr>
+                <a:xfrm>
+                  <a:off x="1889062" y="2342914"/>
+                  <a:ext cx="2195848" cy="299347"/>
+                </a:xfrm>
+                <a:prstGeom prst="rect">
+                  <a:avLst/>
+                </a:prstGeom>
+                <a:blipFill>
+                  <a:blip r:embed="rId5"/>
+                  <a:stretch>
+                    <a:fillRect b="-19231"/>
+                  </a:stretch>
+                </a:blipFill>
+              </p:spPr>
+              <p:txBody>
+                <a:bodyPr/>
+                <a:lstStyle/>
+                <a:p>
+                  <a:r>
+                    <a:rPr lang="en-US">
+                      <a:noFill/>
+                    </a:rPr>
+                    <a:t> </a:t>
+                  </a:r>
+                </a:p>
+              </p:txBody>
+            </p:sp>
+          </mc:Fallback>
+        </mc:AlternateContent>
+        <p:cxnSp>
+          <p:nvCxnSpPr>
+            <p:cNvPr id="87" name="Straight Connector 86">
+              <a:extLst>
+                <a:ext uri="{FF2B5EF4-FFF2-40B4-BE49-F238E27FC236}">
+                  <a16:creationId xmlns:a16="http://schemas.microsoft.com/office/drawing/2014/main" id="{8236529B-EB35-9BB7-AF35-C7603C316F31}"/>
+                </a:ext>
+              </a:extLst>
+            </p:cNvPr>
+            <p:cNvCxnSpPr>
+              <a:cxnSpLocks/>
+            </p:cNvCxnSpPr>
+            <p:nvPr/>
+          </p:nvCxnSpPr>
+          <p:spPr>
+            <a:xfrm>
+              <a:off x="1889062" y="2265085"/>
+              <a:ext cx="2195848" cy="0"/>
+            </a:xfrm>
+            <a:prstGeom prst="line">
+              <a:avLst/>
+            </a:prstGeom>
+          </p:spPr>
+          <p:style>
+            <a:lnRef idx="2">
+              <a:schemeClr val="accent1"/>
+            </a:lnRef>
+            <a:fillRef idx="0">
+              <a:schemeClr val="accent1"/>
+            </a:fillRef>
+            <a:effectRef idx="1">
+              <a:schemeClr val="accent1"/>
+            </a:effectRef>
+            <a:fontRef idx="minor">
+              <a:schemeClr val="tx1"/>
+            </a:fontRef>
+          </p:style>
+        </p:cxnSp>
+      </p:grpSp>
+      <p:grpSp>
+        <p:nvGrpSpPr>
+          <p:cNvPr id="97" name="Group 96">
+            <a:extLst>
+              <a:ext uri="{FF2B5EF4-FFF2-40B4-BE49-F238E27FC236}">
+                <a16:creationId xmlns:a16="http://schemas.microsoft.com/office/drawing/2014/main" id="{8DA4CA50-DACB-4313-205B-A02BA3567751}"/>
+              </a:ext>
+            </a:extLst>
+          </p:cNvPr>
+          <p:cNvGrpSpPr/>
+          <p:nvPr/>
+        </p:nvGrpSpPr>
+        <p:grpSpPr>
+          <a:xfrm>
+            <a:off x="2065211" y="1652290"/>
+            <a:ext cx="2279480" cy="1164602"/>
+            <a:chOff x="3175360" y="2293019"/>
+            <a:chExt cx="2621063" cy="1164602"/>
+          </a:xfrm>
+        </p:grpSpPr>
+        <p:grpSp>
+          <p:nvGrpSpPr>
+            <p:cNvPr id="56" name="Group 55">
+              <a:extLst>
+                <a:ext uri="{FF2B5EF4-FFF2-40B4-BE49-F238E27FC236}">
+                  <a16:creationId xmlns:a16="http://schemas.microsoft.com/office/drawing/2014/main" id="{43BD5599-8EFF-6CCA-A96C-1C32CFB2CC2E}"/>
+                </a:ext>
+              </a:extLst>
+            </p:cNvPr>
+            <p:cNvGrpSpPr/>
+            <p:nvPr/>
+          </p:nvGrpSpPr>
+          <p:grpSpPr>
+            <a:xfrm>
+              <a:off x="3175360" y="2293019"/>
+              <a:ext cx="2621063" cy="1164602"/>
+              <a:chOff x="3369324" y="1355625"/>
+              <a:chExt cx="2621063" cy="1464009"/>
+            </a:xfrm>
+          </p:grpSpPr>
+          <p:grpSp>
+            <p:nvGrpSpPr>
+              <p:cNvPr id="71" name="Group 70">
+                <a:extLst>
+                  <a:ext uri="{FF2B5EF4-FFF2-40B4-BE49-F238E27FC236}">
+                    <a16:creationId xmlns:a16="http://schemas.microsoft.com/office/drawing/2014/main" id="{0D902053-70F1-2D57-6BC9-4EC47446E2D4}"/>
+                  </a:ext>
+                </a:extLst>
+              </p:cNvPr>
+              <p:cNvGrpSpPr/>
+              <p:nvPr/>
+            </p:nvGrpSpPr>
+            <p:grpSpPr>
+              <a:xfrm>
+                <a:off x="3369324" y="1355625"/>
+                <a:ext cx="2621063" cy="1464009"/>
+                <a:chOff x="4981225" y="2281022"/>
+                <a:chExt cx="2621063" cy="1464009"/>
+              </a:xfrm>
+            </p:grpSpPr>
+            <p:sp>
+              <p:nvSpPr>
+                <p:cNvPr id="73" name="Rectangle 72">
+                  <a:extLst>
+                    <a:ext uri="{FF2B5EF4-FFF2-40B4-BE49-F238E27FC236}">
+                      <a16:creationId xmlns:a16="http://schemas.microsoft.com/office/drawing/2014/main" id="{6B939AEA-5B87-F16F-78C9-676ED673EAAD}"/>
+                    </a:ext>
+                  </a:extLst>
+                </p:cNvPr>
+                <p:cNvSpPr/>
+                <p:nvPr/>
+              </p:nvSpPr>
+              <p:spPr>
+                <a:xfrm>
+                  <a:off x="4981225" y="2301548"/>
+                  <a:ext cx="2601532" cy="1443483"/>
+                </a:xfrm>
+                <a:prstGeom prst="rect">
+                  <a:avLst/>
+                </a:prstGeom>
+                <a:solidFill>
+                  <a:schemeClr val="tx2">
+                    <a:lumMod val="25000"/>
+                    <a:lumOff val="75000"/>
+                  </a:schemeClr>
+                </a:solidFill>
+              </p:spPr>
+              <p:style>
+                <a:lnRef idx="2">
+                  <a:schemeClr val="accent1">
+                    <a:shade val="15000"/>
+                  </a:schemeClr>
+                </a:lnRef>
+                <a:fillRef idx="1">
+                  <a:schemeClr val="accent1"/>
+                </a:fillRef>
+                <a:effectRef idx="0">
+                  <a:schemeClr val="accent1"/>
+                </a:effectRef>
+                <a:fontRef idx="minor">
+                  <a:schemeClr val="lt1"/>
+                </a:fontRef>
+              </p:style>
+              <p:txBody>
+                <a:bodyPr rtlCol="0" anchor="ctr"/>
+                <a:lstStyle/>
+                <a:p>
+                  <a:pPr algn="ctr"/>
+                  <a:endParaRPr lang="en-US" dirty="0"/>
+                </a:p>
+              </p:txBody>
+            </p:sp>
+            <p:cxnSp>
+              <p:nvCxnSpPr>
+                <p:cNvPr id="74" name="Straight Connector 73">
+                  <a:extLst>
+                    <a:ext uri="{FF2B5EF4-FFF2-40B4-BE49-F238E27FC236}">
+                      <a16:creationId xmlns:a16="http://schemas.microsoft.com/office/drawing/2014/main" id="{0A232C5A-0D17-8602-22EF-7CF39C741818}"/>
+                    </a:ext>
+                  </a:extLst>
+                </p:cNvPr>
+                <p:cNvCxnSpPr>
+                  <a:cxnSpLocks/>
+                  <a:stCxn id="73" idx="2"/>
+                </p:cNvCxnSpPr>
+                <p:nvPr/>
+              </p:nvCxnSpPr>
+              <p:spPr>
+                <a:xfrm flipV="1">
+                  <a:off x="6281991" y="2733824"/>
+                  <a:ext cx="0" cy="1011206"/>
+                </a:xfrm>
+                <a:prstGeom prst="line">
+                  <a:avLst/>
+                </a:prstGeom>
+              </p:spPr>
+              <p:style>
+                <a:lnRef idx="2">
+                  <a:schemeClr val="accent1"/>
+                </a:lnRef>
+                <a:fillRef idx="0">
+                  <a:schemeClr val="accent1"/>
+                </a:fillRef>
+                <a:effectRef idx="1">
+                  <a:schemeClr val="accent1"/>
+                </a:effectRef>
+                <a:fontRef idx="minor">
+                  <a:schemeClr val="tx1"/>
+                </a:fontRef>
+              </p:style>
+            </p:cxnSp>
+            <p:sp>
+              <p:nvSpPr>
+                <p:cNvPr id="75" name="TextBox 74">
+                  <a:extLst>
+                    <a:ext uri="{FF2B5EF4-FFF2-40B4-BE49-F238E27FC236}">
+                      <a16:creationId xmlns:a16="http://schemas.microsoft.com/office/drawing/2014/main" id="{B87346B2-5575-029B-383D-D4CD35C47042}"/>
+                    </a:ext>
+                  </a:extLst>
+                </p:cNvPr>
+                <p:cNvSpPr txBox="1"/>
+                <p:nvPr/>
+              </p:nvSpPr>
+              <p:spPr>
+                <a:xfrm>
+                  <a:off x="4981225" y="2281022"/>
+                  <a:ext cx="2601532" cy="464285"/>
+                </a:xfrm>
+                <a:prstGeom prst="rect">
+                  <a:avLst/>
+                </a:prstGeom>
+                <a:noFill/>
+              </p:spPr>
+              <p:txBody>
+                <a:bodyPr wrap="square" rtlCol="0">
+                  <a:spAutoFit/>
+                </a:bodyPr>
+                <a:lstStyle/>
+                <a:p>
+                  <a:pPr algn="ctr"/>
+                  <a:r>
+                    <a:rPr lang="en-US" sz="1600" dirty="0">
+                      <a:latin typeface="Helvetica" pitchFamily="2" charset="0"/>
+                    </a:rPr>
+                    <a:t>Testing</a:t>
+                  </a:r>
+                  <a:r>
+                    <a:rPr lang="en-US" dirty="0">
+                      <a:latin typeface="Helvetica" pitchFamily="2" charset="0"/>
+                    </a:rPr>
+                    <a:t> dataset</a:t>
+                  </a:r>
+                </a:p>
+              </p:txBody>
+            </p:sp>
+            <p:cxnSp>
+              <p:nvCxnSpPr>
+                <p:cNvPr id="76" name="Straight Connector 75">
+                  <a:extLst>
+                    <a:ext uri="{FF2B5EF4-FFF2-40B4-BE49-F238E27FC236}">
+                      <a16:creationId xmlns:a16="http://schemas.microsoft.com/office/drawing/2014/main" id="{869782CF-50E4-3084-3E25-3544821AFC38}"/>
+                    </a:ext>
+                  </a:extLst>
+                </p:cNvPr>
+                <p:cNvCxnSpPr>
+                  <a:cxnSpLocks/>
+                </p:cNvCxnSpPr>
+                <p:nvPr/>
+              </p:nvCxnSpPr>
+              <p:spPr>
+                <a:xfrm>
+                  <a:off x="4981225" y="2733825"/>
+                  <a:ext cx="2601532" cy="0"/>
+                </a:xfrm>
+                <a:prstGeom prst="line">
+                  <a:avLst/>
+                </a:prstGeom>
+              </p:spPr>
+              <p:style>
+                <a:lnRef idx="2">
+                  <a:schemeClr val="accent1"/>
+                </a:lnRef>
+                <a:fillRef idx="0">
+                  <a:schemeClr val="accent1"/>
+                </a:fillRef>
+                <a:effectRef idx="1">
+                  <a:schemeClr val="accent1"/>
+                </a:effectRef>
+                <a:fontRef idx="minor">
+                  <a:schemeClr val="tx1"/>
+                </a:fontRef>
+              </p:style>
+            </p:cxnSp>
+            <p:sp>
+              <p:nvSpPr>
+                <p:cNvPr id="77" name="TextBox 76">
+                  <a:extLst>
+                    <a:ext uri="{FF2B5EF4-FFF2-40B4-BE49-F238E27FC236}">
+                      <a16:creationId xmlns:a16="http://schemas.microsoft.com/office/drawing/2014/main" id="{A5654254-16CA-5E18-1D3B-DF3BE9EE7471}"/>
+                    </a:ext>
+                  </a:extLst>
+                </p:cNvPr>
+                <p:cNvSpPr txBox="1"/>
+                <p:nvPr/>
+              </p:nvSpPr>
+              <p:spPr>
+                <a:xfrm>
+                  <a:off x="5000756" y="2744955"/>
+                  <a:ext cx="1257337" cy="386903"/>
+                </a:xfrm>
+                <a:prstGeom prst="rect">
+                  <a:avLst/>
+                </a:prstGeom>
+                <a:noFill/>
+              </p:spPr>
+              <p:txBody>
+                <a:bodyPr wrap="square" rtlCol="0">
+                  <a:spAutoFit/>
+                </a:bodyPr>
+                <a:lstStyle/>
+                <a:p>
+                  <a:pPr algn="ctr"/>
+                  <a:r>
+                    <a:rPr lang="en-US" sz="1400" i="1" dirty="0">
+                      <a:latin typeface="Helvetica" pitchFamily="2" charset="0"/>
+                    </a:rPr>
+                    <a:t>Human</a:t>
+                  </a:r>
+                  <a:endParaRPr lang="en-US" sz="1600" i="1" dirty="0">
+                    <a:latin typeface="Helvetica" pitchFamily="2" charset="0"/>
+                  </a:endParaRPr>
+                </a:p>
+              </p:txBody>
+            </p:sp>
+            <p:sp>
+              <p:nvSpPr>
+                <p:cNvPr id="78" name="TextBox 77">
+                  <a:extLst>
+                    <a:ext uri="{FF2B5EF4-FFF2-40B4-BE49-F238E27FC236}">
+                      <a16:creationId xmlns:a16="http://schemas.microsoft.com/office/drawing/2014/main" id="{7D8DAD1D-CBC0-DC05-B164-E4A87B5B3D57}"/>
+                    </a:ext>
+                  </a:extLst>
+                </p:cNvPr>
+                <p:cNvSpPr txBox="1"/>
+                <p:nvPr/>
+              </p:nvSpPr>
+              <p:spPr>
+                <a:xfrm>
+                  <a:off x="6305889" y="2744955"/>
+                  <a:ext cx="1252968" cy="386903"/>
+                </a:xfrm>
+                <a:prstGeom prst="rect">
+                  <a:avLst/>
+                </a:prstGeom>
+                <a:noFill/>
+              </p:spPr>
+              <p:txBody>
+                <a:bodyPr wrap="square" rtlCol="0">
+                  <a:spAutoFit/>
+                </a:bodyPr>
+                <a:lstStyle/>
+                <a:p>
+                  <a:pPr algn="ctr"/>
+                  <a:r>
+                    <a:rPr lang="en-US" sz="1400" i="1" dirty="0">
+                      <a:latin typeface="Helvetica" pitchFamily="2" charset="0"/>
+                    </a:rPr>
+                    <a:t>LLM</a:t>
+                  </a:r>
+                  <a:endParaRPr lang="en-US" i="1" dirty="0">
+                    <a:latin typeface="Helvetica" pitchFamily="2" charset="0"/>
+                  </a:endParaRPr>
+                </a:p>
+              </p:txBody>
+            </p:sp>
+            <p:cxnSp>
+              <p:nvCxnSpPr>
+                <p:cNvPr id="79" name="Straight Connector 78">
+                  <a:extLst>
+                    <a:ext uri="{FF2B5EF4-FFF2-40B4-BE49-F238E27FC236}">
+                      <a16:creationId xmlns:a16="http://schemas.microsoft.com/office/drawing/2014/main" id="{723928EB-4226-3BB3-8DA3-B458EEFD095D}"/>
+                    </a:ext>
+                  </a:extLst>
+                </p:cNvPr>
+                <p:cNvCxnSpPr>
+                  <a:cxnSpLocks/>
+                </p:cNvCxnSpPr>
+                <p:nvPr/>
+              </p:nvCxnSpPr>
+              <p:spPr>
+                <a:xfrm>
+                  <a:off x="5000756" y="3117643"/>
+                  <a:ext cx="2601532" cy="0"/>
+                </a:xfrm>
+                <a:prstGeom prst="line">
+                  <a:avLst/>
+                </a:prstGeom>
+                <a:ln>
+                  <a:prstDash val="sysDash"/>
+                </a:ln>
+              </p:spPr>
+              <p:style>
+                <a:lnRef idx="2">
+                  <a:schemeClr val="accent1"/>
+                </a:lnRef>
+                <a:fillRef idx="0">
+                  <a:schemeClr val="accent1"/>
+                </a:fillRef>
+                <a:effectRef idx="1">
+                  <a:schemeClr val="accent1"/>
+                </a:effectRef>
+                <a:fontRef idx="minor">
+                  <a:schemeClr val="tx1"/>
+                </a:fontRef>
+              </p:style>
+            </p:cxnSp>
+          </p:grpSp>
+          <mc:AlternateContent xmlns:mc="http://schemas.openxmlformats.org/markup-compatibility/2006">
+            <mc:Choice xmlns:a14="http://schemas.microsoft.com/office/drawing/2010/main" Requires="a14">
+              <p:sp>
+                <p:nvSpPr>
+                  <p:cNvPr id="72" name="TextBox 71">
+                    <a:extLst>
+                      <a:ext uri="{FF2B5EF4-FFF2-40B4-BE49-F238E27FC236}">
+                        <a16:creationId xmlns:a16="http://schemas.microsoft.com/office/drawing/2014/main" id="{64E8069F-1B39-E862-B2A6-DBD521A6D517}"/>
+                      </a:ext>
+                    </a:extLst>
+                  </p:cNvPr>
+                  <p:cNvSpPr txBox="1"/>
+                  <p:nvPr/>
+                </p:nvSpPr>
+                <p:spPr>
+                  <a:xfrm>
+                    <a:off x="3571368" y="2239036"/>
+                    <a:ext cx="872828" cy="495235"/>
+                  </a:xfrm>
+                  <a:prstGeom prst="rect">
+                    <a:avLst/>
+                  </a:prstGeom>
+                  <a:noFill/>
+                </p:spPr>
+                <p:txBody>
+                  <a:bodyPr wrap="square" rtlCol="0">
+                    <a:spAutoFit/>
+                  </a:bodyPr>
+                  <a:lstStyle/>
+                  <a:p>
+                    <a:pPr algn="ctr"/>
+                    <a14:m>
+                      <m:oMathPara xmlns:m="http://schemas.openxmlformats.org/officeDocument/2006/math">
+                        <m:oMathParaPr>
+                          <m:jc m:val="center"/>
+                        </m:oMathParaPr>
+                        <m:oMath xmlns:m="http://schemas.openxmlformats.org/officeDocument/2006/math">
+                          <m:sSubSup>
+                            <m:sSubSupPr>
+                              <m:ctrlPr>
+                                <a:rPr lang="en-US" sz="1400" b="1" i="1" smtClean="0">
+                                  <a:latin typeface="Cambria Math" panose="02040503050406030204" pitchFamily="18" charset="0"/>
+                                </a:rPr>
+                              </m:ctrlPr>
+                            </m:sSubSupPr>
+                            <m:e>
+                              <m:r>
+                                <a:rPr lang="en-US" sz="1400" b="1" i="1" smtClean="0">
+                                  <a:latin typeface="Cambria Math" panose="02040503050406030204" pitchFamily="18" charset="0"/>
+                                </a:rPr>
+                                <m:t>𝒙</m:t>
+                              </m:r>
+                            </m:e>
+                            <m:sub>
+                              <m:r>
+                                <m:rPr>
+                                  <m:nor/>
+                                </m:rPr>
+                                <a:rPr lang="en-US" sz="1400" b="0" i="0" smtClean="0">
+                                  <a:latin typeface="Cambria Math" panose="02040503050406030204" pitchFamily="18" charset="0"/>
+                                </a:rPr>
+                                <m:t>human</m:t>
+                              </m:r>
+                            </m:sub>
+                            <m:sup>
+                              <m:r>
+                                <a:rPr lang="en-US" sz="1400" b="0" i="1" smtClean="0">
+                                  <a:latin typeface="Cambria Math" panose="02040503050406030204" pitchFamily="18" charset="0"/>
+                                </a:rPr>
+                                <m:t>(</m:t>
+                              </m:r>
+                              <m:r>
+                                <a:rPr lang="en-US" sz="1400" b="0" i="1" smtClean="0">
+                                  <a:latin typeface="Cambria Math" panose="02040503050406030204" pitchFamily="18" charset="0"/>
+                                </a:rPr>
+                                <m:t>𝑖</m:t>
+                              </m:r>
+                              <m:r>
+                                <a:rPr lang="en-US" sz="1400" b="0" i="1" smtClean="0">
+                                  <a:latin typeface="Cambria Math" panose="02040503050406030204" pitchFamily="18" charset="0"/>
+                                </a:rPr>
+                                <m:t>)</m:t>
+                              </m:r>
+                            </m:sup>
+                          </m:sSubSup>
+                        </m:oMath>
+                      </m:oMathPara>
+                    </a14:m>
+                    <a:endParaRPr lang="en-US" sz="1400" dirty="0"/>
+                  </a:p>
+                </p:txBody>
+              </p:sp>
+            </mc:Choice>
+            <mc:Fallback>
+              <p:sp>
+                <p:nvSpPr>
+                  <p:cNvPr id="72" name="TextBox 71">
+                    <a:extLst>
+                      <a:ext uri="{FF2B5EF4-FFF2-40B4-BE49-F238E27FC236}">
+                        <a16:creationId xmlns:a16="http://schemas.microsoft.com/office/drawing/2014/main" id="{64E8069F-1B39-E862-B2A6-DBD521A6D517}"/>
+                      </a:ext>
+                    </a:extLst>
+                  </p:cNvPr>
+                  <p:cNvSpPr txBox="1">
+                    <a:spLocks noRot="1" noChangeAspect="1" noMove="1" noResize="1" noEditPoints="1" noAdjustHandles="1" noChangeArrowheads="1" noChangeShapeType="1" noTextEdit="1"/>
+                  </p:cNvSpPr>
+                  <p:nvPr/>
+                </p:nvSpPr>
+                <p:spPr>
+                  <a:xfrm>
+                    <a:off x="3571368" y="2239036"/>
+                    <a:ext cx="872828" cy="495235"/>
+                  </a:xfrm>
+                  <a:prstGeom prst="rect">
+                    <a:avLst/>
+                  </a:prstGeom>
+                  <a:blipFill>
+                    <a:blip r:embed="rId6"/>
+                    <a:stretch>
+                      <a:fillRect l="-1639" b="-3125"/>
+                    </a:stretch>
+                  </a:blipFill>
+                </p:spPr>
+                <p:txBody>
+                  <a:bodyPr/>
+                  <a:lstStyle/>
+                  <a:p>
+                    <a:r>
+                      <a:rPr lang="en-US">
+                        <a:noFill/>
+                      </a:rPr>
+                      <a:t> </a:t>
+                    </a:r>
+                  </a:p>
+                </p:txBody>
+              </p:sp>
+            </mc:Fallback>
+          </mc:AlternateContent>
+        </p:grpSp>
+        <mc:AlternateContent xmlns:mc="http://schemas.openxmlformats.org/markup-compatibility/2006">
+          <mc:Choice xmlns:a14="http://schemas.microsoft.com/office/drawing/2010/main" Requires="a14">
+            <p:sp>
+              <p:nvSpPr>
+                <p:cNvPr id="57" name="TextBox 56">
+                  <a:extLst>
+                    <a:ext uri="{FF2B5EF4-FFF2-40B4-BE49-F238E27FC236}">
+                      <a16:creationId xmlns:a16="http://schemas.microsoft.com/office/drawing/2014/main" id="{799E1ECB-C66F-AC54-C71A-53AFFC0F759F}"/>
+                    </a:ext>
+                  </a:extLst>
+                </p:cNvPr>
+                <p:cNvSpPr txBox="1"/>
+                <p:nvPr/>
+              </p:nvSpPr>
+              <p:spPr>
+                <a:xfrm>
+                  <a:off x="4841021" y="2981494"/>
+                  <a:ext cx="567157" cy="393954"/>
+                </a:xfrm>
+                <a:prstGeom prst="rect">
+                  <a:avLst/>
+                </a:prstGeom>
+                <a:noFill/>
+              </p:spPr>
+              <p:txBody>
+                <a:bodyPr wrap="square" rtlCol="0">
+                  <a:spAutoFit/>
+                </a:bodyPr>
+                <a:lstStyle/>
+                <a:p>
+                  <a:pPr algn="ctr"/>
+                  <a14:m>
+                    <m:oMathPara xmlns:m="http://schemas.openxmlformats.org/officeDocument/2006/math">
+                      <m:oMathParaPr>
+                        <m:jc m:val="center"/>
+                      </m:oMathParaPr>
+                      <m:oMath xmlns:m="http://schemas.openxmlformats.org/officeDocument/2006/math">
+                        <m:sSubSup>
+                          <m:sSubSupPr>
+                            <m:ctrlPr>
+                              <a:rPr lang="en-US" sz="1400" b="1" i="1" smtClean="0">
+                                <a:latin typeface="Cambria Math" panose="02040503050406030204" pitchFamily="18" charset="0"/>
+                              </a:rPr>
+                            </m:ctrlPr>
+                          </m:sSubSupPr>
+                          <m:e>
+                            <m:r>
+                              <a:rPr lang="en-US" sz="1400" b="1" i="1" smtClean="0">
+                                <a:latin typeface="Cambria Math" panose="02040503050406030204" pitchFamily="18" charset="0"/>
+                              </a:rPr>
+                              <m:t>𝒙</m:t>
+                            </m:r>
+                          </m:e>
+                          <m:sub>
+                            <m:r>
+                              <m:rPr>
+                                <m:nor/>
+                              </m:rPr>
+                              <a:rPr lang="en-US" sz="1400" b="0" i="0" smtClean="0">
+                                <a:latin typeface="Cambria Math" panose="02040503050406030204" pitchFamily="18" charset="0"/>
+                              </a:rPr>
+                              <m:t>llm</m:t>
+                            </m:r>
+                          </m:sub>
+                          <m:sup>
+                            <m:r>
+                              <a:rPr lang="en-US" sz="1400" b="0" i="1" smtClean="0">
+                                <a:latin typeface="Cambria Math" panose="02040503050406030204" pitchFamily="18" charset="0"/>
+                              </a:rPr>
+                              <m:t>(</m:t>
+                            </m:r>
+                            <m:r>
+                              <a:rPr lang="en-US" sz="1400" b="0" i="1" smtClean="0">
+                                <a:latin typeface="Cambria Math" panose="02040503050406030204" pitchFamily="18" charset="0"/>
+                              </a:rPr>
+                              <m:t>𝑖</m:t>
+                            </m:r>
+                            <m:r>
+                              <a:rPr lang="en-US" sz="1400" b="0" i="1" smtClean="0">
+                                <a:latin typeface="Cambria Math" panose="02040503050406030204" pitchFamily="18" charset="0"/>
+                              </a:rPr>
+                              <m:t>)</m:t>
+                            </m:r>
+                          </m:sup>
+                        </m:sSubSup>
+                      </m:oMath>
+                    </m:oMathPara>
+                  </a14:m>
+                  <a:endParaRPr lang="en-US" sz="1400" dirty="0"/>
+                </a:p>
+              </p:txBody>
+            </p:sp>
+          </mc:Choice>
+          <mc:Fallback>
+            <p:sp>
+              <p:nvSpPr>
+                <p:cNvPr id="57" name="TextBox 56">
+                  <a:extLst>
+                    <a:ext uri="{FF2B5EF4-FFF2-40B4-BE49-F238E27FC236}">
+                      <a16:creationId xmlns:a16="http://schemas.microsoft.com/office/drawing/2014/main" id="{799E1ECB-C66F-AC54-C71A-53AFFC0F759F}"/>
+                    </a:ext>
+                  </a:extLst>
+                </p:cNvPr>
+                <p:cNvSpPr txBox="1">
+                  <a:spLocks noRot="1" noChangeAspect="1" noMove="1" noResize="1" noEditPoints="1" noAdjustHandles="1" noChangeArrowheads="1" noChangeShapeType="1" noTextEdit="1"/>
+                </p:cNvSpPr>
+                <p:nvPr/>
+              </p:nvSpPr>
+              <p:spPr>
+                <a:xfrm>
+                  <a:off x="4841021" y="2981494"/>
+                  <a:ext cx="567157" cy="393954"/>
+                </a:xfrm>
+                <a:prstGeom prst="rect">
+                  <a:avLst/>
+                </a:prstGeom>
+                <a:blipFill>
+                  <a:blip r:embed="rId7"/>
+                  <a:stretch>
+                    <a:fillRect b="-3125"/>
+                  </a:stretch>
+                </a:blipFill>
+              </p:spPr>
+              <p:txBody>
+                <a:bodyPr/>
+                <a:lstStyle/>
+                <a:p>
+                  <a:r>
+                    <a:rPr lang="en-US">
+                      <a:noFill/>
+                    </a:rPr>
+                    <a:t> </a:t>
+                  </a:r>
+                </a:p>
+              </p:txBody>
+            </p:sp>
+          </mc:Fallback>
+        </mc:AlternateContent>
+      </p:grpSp>
+      <p:sp>
+        <p:nvSpPr>
+          <p:cNvPr id="67" name="TextBox 66">
+            <a:extLst>
+              <a:ext uri="{FF2B5EF4-FFF2-40B4-BE49-F238E27FC236}">
+                <a16:creationId xmlns:a16="http://schemas.microsoft.com/office/drawing/2014/main" id="{A7B7E7C6-6B32-5059-2E5C-40D68ACFDCC6}"/>
+              </a:ext>
+            </a:extLst>
+          </p:cNvPr>
+          <p:cNvSpPr txBox="1"/>
+          <p:nvPr/>
+        </p:nvSpPr>
+        <p:spPr>
+          <a:xfrm>
+            <a:off x="2533540" y="4803910"/>
+            <a:ext cx="1284269" cy="338554"/>
+          </a:xfrm>
+          <a:prstGeom prst="rect">
+            <a:avLst/>
+          </a:prstGeom>
+          <a:noFill/>
+        </p:spPr>
+        <p:txBody>
+          <a:bodyPr wrap="square" rtlCol="0">
+            <a:spAutoFit/>
+          </a:bodyPr>
+          <a:lstStyle/>
+          <a:p>
+            <a:pPr algn="ctr"/>
+            <a:r>
+              <a:rPr lang="en-US" sz="1600" dirty="0">
+                <a:latin typeface="Helvetica" pitchFamily="2" charset="0"/>
+              </a:rPr>
+              <a:t>AUROC</a:t>
+            </a:r>
+            <a:endParaRPr lang="en-US" dirty="0">
+              <a:latin typeface="Helvetica" pitchFamily="2" charset="0"/>
+            </a:endParaRPr>
+          </a:p>
+        </p:txBody>
+      </p:sp>
+      <p:grpSp>
+        <p:nvGrpSpPr>
+          <p:cNvPr id="101" name="Group 100">
+            <a:extLst>
+              <a:ext uri="{FF2B5EF4-FFF2-40B4-BE49-F238E27FC236}">
+                <a16:creationId xmlns:a16="http://schemas.microsoft.com/office/drawing/2014/main" id="{DFC312B2-3452-51E7-CF72-230041C15239}"/>
+              </a:ext>
+            </a:extLst>
+          </p:cNvPr>
+          <p:cNvGrpSpPr/>
+          <p:nvPr/>
+        </p:nvGrpSpPr>
+        <p:grpSpPr>
+          <a:xfrm>
+            <a:off x="1282284" y="4262920"/>
+            <a:ext cx="3829641" cy="1059621"/>
+            <a:chOff x="1216528" y="4418912"/>
+            <a:chExt cx="3829641" cy="1059621"/>
+          </a:xfrm>
+        </p:grpSpPr>
+        <p:pic>
+          <p:nvPicPr>
+            <p:cNvPr id="63" name="Picture 2" descr="AUC ROC Curve in Machine Learning | GeeksforGeeks">
+              <a:extLst>
+                <a:ext uri="{FF2B5EF4-FFF2-40B4-BE49-F238E27FC236}">
+                  <a16:creationId xmlns:a16="http://schemas.microsoft.com/office/drawing/2014/main" id="{892B49FE-381E-71F5-E78F-2BE1E18283CD}"/>
+                </a:ext>
+              </a:extLst>
+            </p:cNvPr>
+            <p:cNvPicPr>
+              <a:picLocks noChangeAspect="1" noChangeArrowheads="1"/>
+            </p:cNvPicPr>
+            <p:nvPr/>
+          </p:nvPicPr>
+          <p:blipFill>
+            <a:blip r:embed="rId8">
+              <a:extLst>
+                <a:ext uri="{28A0092B-C50C-407E-A947-70E740481C1C}">
+                  <a14:useLocalDpi xmlns:a14="http://schemas.microsoft.com/office/drawing/2010/main" val="0"/>
+                </a:ext>
+              </a:extLst>
+            </a:blip>
+            <a:srcRect/>
+            <a:stretch>
+              <a:fillRect/>
+            </a:stretch>
+          </p:blipFill>
+          <p:spPr bwMode="auto">
+            <a:xfrm>
+              <a:off x="3605084" y="4418912"/>
+              <a:ext cx="1441085" cy="1059621"/>
+            </a:xfrm>
+            <a:prstGeom prst="rect">
+              <a:avLst/>
+            </a:prstGeom>
+            <a:noFill/>
+            <a:extLst>
+              <a:ext uri="{909E8E84-426E-40DD-AFC4-6F175D3DCCD1}">
+                <a14:hiddenFill xmlns:a14="http://schemas.microsoft.com/office/drawing/2010/main">
+                  <a:solidFill>
+                    <a:srgbClr val="FFFFFF"/>
+                  </a:solidFill>
+                </a14:hiddenFill>
+              </a:ext>
+            </a:extLst>
+          </p:spPr>
+        </p:pic>
+        <p:pic>
+          <p:nvPicPr>
+            <p:cNvPr id="100" name="Picture 2" descr="AUC ROC Curve in Machine Learning | GeeksforGeeks">
+              <a:extLst>
+                <a:ext uri="{FF2B5EF4-FFF2-40B4-BE49-F238E27FC236}">
+                  <a16:creationId xmlns:a16="http://schemas.microsoft.com/office/drawing/2014/main" id="{D4426AEA-2620-28AB-357F-FCEB9FED5512}"/>
+                </a:ext>
+              </a:extLst>
+            </p:cNvPr>
+            <p:cNvPicPr>
+              <a:picLocks noChangeAspect="1" noChangeArrowheads="1"/>
+            </p:cNvPicPr>
+            <p:nvPr/>
+          </p:nvPicPr>
+          <p:blipFill>
+            <a:blip r:embed="rId9">
+              <a:grayscl/>
+              <a:extLst>
+                <a:ext uri="{28A0092B-C50C-407E-A947-70E740481C1C}">
+                  <a14:useLocalDpi xmlns:a14="http://schemas.microsoft.com/office/drawing/2010/main" val="0"/>
+                </a:ext>
+              </a:extLst>
+            </a:blip>
+            <a:srcRect/>
+            <a:stretch>
+              <a:fillRect/>
+            </a:stretch>
+          </p:blipFill>
+          <p:spPr bwMode="auto">
+            <a:xfrm>
+              <a:off x="1216528" y="4418912"/>
+              <a:ext cx="1441085" cy="1059621"/>
+            </a:xfrm>
+            <a:prstGeom prst="rect">
+              <a:avLst/>
+            </a:prstGeom>
+            <a:noFill/>
+            <a:extLst>
+              <a:ext uri="{909E8E84-426E-40DD-AFC4-6F175D3DCCD1}">
+                <a14:hiddenFill xmlns:a14="http://schemas.microsoft.com/office/drawing/2010/main">
+                  <a:solidFill>
+                    <a:srgbClr val="FFFFFF"/>
+                  </a:solidFill>
+                </a14:hiddenFill>
+              </a:ext>
+            </a:extLst>
+          </p:spPr>
+        </p:pic>
+      </p:grpSp>
+      <p:cxnSp>
+        <p:nvCxnSpPr>
+          <p:cNvPr id="105" name="Elbow Connector 104">
+            <a:extLst>
+              <a:ext uri="{FF2B5EF4-FFF2-40B4-BE49-F238E27FC236}">
+                <a16:creationId xmlns:a16="http://schemas.microsoft.com/office/drawing/2014/main" id="{B0DEF531-1463-9FDF-2ECD-7BEC0351F960}"/>
+              </a:ext>
+            </a:extLst>
+          </p:cNvPr>
+          <p:cNvCxnSpPr>
+            <a:cxnSpLocks/>
+            <a:stCxn id="83" idx="3"/>
+            <a:endCxn id="90" idx="1"/>
+          </p:cNvCxnSpPr>
+          <p:nvPr/>
+        </p:nvCxnSpPr>
+        <p:spPr>
+          <a:xfrm flipV="1">
+            <a:off x="3204957" y="1110103"/>
+            <a:ext cx="302890" cy="1"/>
+          </a:xfrm>
+          <a:prstGeom prst="bentConnector3">
+            <a:avLst/>
+          </a:prstGeom>
+          <a:ln w="38100">
+            <a:solidFill>
+              <a:schemeClr val="tx1"/>
+            </a:solidFill>
+            <a:tailEnd type="triangle"/>
+          </a:ln>
+        </p:spPr>
+        <p:style>
+          <a:lnRef idx="2">
+            <a:schemeClr val="accent1"/>
+          </a:lnRef>
+          <a:fillRef idx="0">
+            <a:schemeClr val="accent1"/>
+          </a:fillRef>
+          <a:effectRef idx="1">
+            <a:schemeClr val="accent1"/>
+          </a:effectRef>
+          <a:fontRef idx="minor">
+            <a:schemeClr val="tx1"/>
+          </a:fontRef>
+        </p:style>
+      </p:cxnSp>
+      <p:cxnSp>
+        <p:nvCxnSpPr>
+          <p:cNvPr id="106" name="Elbow Connector 105">
+            <a:extLst>
+              <a:ext uri="{FF2B5EF4-FFF2-40B4-BE49-F238E27FC236}">
+                <a16:creationId xmlns:a16="http://schemas.microsoft.com/office/drawing/2014/main" id="{DDE60987-4F33-4F28-F277-4694AB8319E6}"/>
+              </a:ext>
+            </a:extLst>
+          </p:cNvPr>
+          <p:cNvCxnSpPr>
+            <a:cxnSpLocks/>
+            <a:endCxn id="57" idx="3"/>
+          </p:cNvCxnSpPr>
+          <p:nvPr/>
+        </p:nvCxnSpPr>
+        <p:spPr>
+          <a:xfrm rot="5400000">
+            <a:off x="3848413" y="1671781"/>
+            <a:ext cx="1024592" cy="707331"/>
+          </a:xfrm>
+          <a:prstGeom prst="bentConnector2">
+            <a:avLst/>
+          </a:prstGeom>
+          <a:ln w="38100">
+            <a:solidFill>
+              <a:schemeClr val="tx1"/>
+            </a:solidFill>
+            <a:tailEnd type="triangle"/>
+          </a:ln>
+        </p:spPr>
+        <p:style>
+          <a:lnRef idx="2">
+            <a:schemeClr val="accent1"/>
+          </a:lnRef>
+          <a:fillRef idx="0">
+            <a:schemeClr val="accent1"/>
+          </a:fillRef>
+          <a:effectRef idx="1">
+            <a:schemeClr val="accent1"/>
+          </a:effectRef>
+          <a:fontRef idx="minor">
+            <a:schemeClr val="tx1"/>
+          </a:fontRef>
+        </p:style>
+      </p:cxnSp>
+      <p:cxnSp>
+        <p:nvCxnSpPr>
+          <p:cNvPr id="113" name="Elbow Connector 112">
+            <a:extLst>
+              <a:ext uri="{FF2B5EF4-FFF2-40B4-BE49-F238E27FC236}">
+                <a16:creationId xmlns:a16="http://schemas.microsoft.com/office/drawing/2014/main" id="{8666E3E5-8705-059C-FD4D-82F1425C8601}"/>
+              </a:ext>
+            </a:extLst>
+          </p:cNvPr>
+          <p:cNvCxnSpPr>
+            <a:cxnSpLocks/>
+            <a:endCxn id="72" idx="1"/>
+          </p:cNvCxnSpPr>
+          <p:nvPr/>
+        </p:nvCxnSpPr>
+        <p:spPr>
+          <a:xfrm rot="16200000" flipH="1">
+            <a:off x="1457289" y="1768374"/>
+            <a:ext cx="1038859" cy="528412"/>
+          </a:xfrm>
+          <a:prstGeom prst="bentConnector2">
+            <a:avLst/>
+          </a:prstGeom>
+          <a:ln w="38100">
+            <a:solidFill>
+              <a:schemeClr val="tx1"/>
+            </a:solidFill>
+            <a:tailEnd type="triangle"/>
+          </a:ln>
+        </p:spPr>
+        <p:style>
+          <a:lnRef idx="2">
+            <a:schemeClr val="accent1"/>
+          </a:lnRef>
+          <a:fillRef idx="0">
+            <a:schemeClr val="accent1"/>
+          </a:fillRef>
+          <a:effectRef idx="1">
+            <a:schemeClr val="accent1"/>
+          </a:effectRef>
+          <a:fontRef idx="minor">
+            <a:schemeClr val="tx1"/>
+          </a:fontRef>
+        </p:style>
+      </p:cxnSp>
+      <p:sp>
+        <p:nvSpPr>
+          <p:cNvPr id="118" name="Bent Arrow 117">
+            <a:extLst>
+              <a:ext uri="{FF2B5EF4-FFF2-40B4-BE49-F238E27FC236}">
+                <a16:creationId xmlns:a16="http://schemas.microsoft.com/office/drawing/2014/main" id="{F42762D6-6FA2-6BFB-C650-5732518E07E9}"/>
+              </a:ext>
+            </a:extLst>
+          </p:cNvPr>
+          <p:cNvSpPr/>
+          <p:nvPr/>
+        </p:nvSpPr>
+        <p:spPr>
+          <a:xfrm rot="10800000">
+            <a:off x="2589088" y="4104555"/>
+            <a:ext cx="723822" cy="635392"/>
+          </a:xfrm>
+          <a:prstGeom prst="bentArrow">
+            <a:avLst>
+              <a:gd name="adj1" fmla="val 14536"/>
+              <a:gd name="adj2" fmla="val 16402"/>
+              <a:gd name="adj3" fmla="val 25000"/>
+              <a:gd name="adj4" fmla="val 4659"/>
+            </a:avLst>
+          </a:prstGeom>
+          <a:solidFill>
+            <a:schemeClr val="bg1">
+              <a:lumMod val="85000"/>
+            </a:schemeClr>
+          </a:solidFill>
+          <a:ln>
+            <a:solidFill>
+              <a:schemeClr val="tx1"/>
+            </a:solidFill>
+          </a:ln>
+        </p:spPr>
+        <p:style>
+          <a:lnRef idx="2">
+            <a:schemeClr val="accent1">
+              <a:shade val="15000"/>
+            </a:schemeClr>
+          </a:lnRef>
+          <a:fillRef idx="1">
+            <a:schemeClr val="accent1"/>
+          </a:fillRef>
+          <a:effectRef idx="0">
+            <a:schemeClr val="accent1"/>
+          </a:effectRef>
+          <a:fontRef idx="minor">
+            <a:schemeClr val="lt1"/>
+          </a:fontRef>
+        </p:style>
+        <p:txBody>
+          <a:bodyPr rtlCol="0" anchor="ctr"/>
+          <a:lstStyle/>
+          <a:p>
+            <a:pPr algn="ctr"/>
+            <a:endParaRPr lang="en-US">
+              <a:solidFill>
+                <a:schemeClr val="tx1"/>
+              </a:solidFill>
+            </a:endParaRPr>
+          </a:p>
+        </p:txBody>
+      </p:sp>
+      <p:sp>
+        <p:nvSpPr>
+          <p:cNvPr id="119" name="Bent Arrow 118">
+            <a:extLst>
+              <a:ext uri="{FF2B5EF4-FFF2-40B4-BE49-F238E27FC236}">
+                <a16:creationId xmlns:a16="http://schemas.microsoft.com/office/drawing/2014/main" id="{59A22DF8-5B47-ED35-F871-C69F133A02B9}"/>
+              </a:ext>
+            </a:extLst>
+          </p:cNvPr>
+          <p:cNvSpPr/>
+          <p:nvPr/>
+        </p:nvSpPr>
+        <p:spPr>
+          <a:xfrm rot="10800000" flipH="1">
+            <a:off x="3435558" y="4104558"/>
+            <a:ext cx="437799" cy="635393"/>
+          </a:xfrm>
+          <a:prstGeom prst="bentArrow">
+            <a:avLst>
+              <a:gd name="adj1" fmla="val 20983"/>
+              <a:gd name="adj2" fmla="val 25000"/>
+              <a:gd name="adj3" fmla="val 36203"/>
+              <a:gd name="adj4" fmla="val 4738"/>
+            </a:avLst>
+          </a:prstGeom>
+          <a:solidFill>
+            <a:schemeClr val="accent6">
+              <a:lumMod val="20000"/>
+              <a:lumOff val="80000"/>
+            </a:schemeClr>
+          </a:solidFill>
+        </p:spPr>
+        <p:style>
+          <a:lnRef idx="2">
+            <a:schemeClr val="accent1">
+              <a:shade val="15000"/>
+            </a:schemeClr>
+          </a:lnRef>
+          <a:fillRef idx="1">
+            <a:schemeClr val="accent1"/>
+          </a:fillRef>
+          <a:effectRef idx="0">
+            <a:schemeClr val="accent1"/>
+          </a:effectRef>
+          <a:fontRef idx="minor">
+            <a:schemeClr val="lt1"/>
+          </a:fontRef>
+        </p:style>
+        <p:txBody>
+          <a:bodyPr rtlCol="0" anchor="ctr"/>
+          <a:lstStyle/>
+          <a:p>
+            <a:pPr algn="ctr"/>
+            <a:endParaRPr lang="en-US">
+              <a:solidFill>
+                <a:schemeClr val="tx1"/>
+              </a:solidFill>
+            </a:endParaRPr>
+          </a:p>
+        </p:txBody>
+      </p:sp>
+      <p:sp>
+        <p:nvSpPr>
+          <p:cNvPr id="131" name="Down Arrow 130">
+            <a:extLst>
+              <a:ext uri="{FF2B5EF4-FFF2-40B4-BE49-F238E27FC236}">
+                <a16:creationId xmlns:a16="http://schemas.microsoft.com/office/drawing/2014/main" id="{51368F4D-4053-E598-7C36-1196F30555A2}"/>
+              </a:ext>
+            </a:extLst>
+          </p:cNvPr>
+          <p:cNvSpPr/>
+          <p:nvPr/>
+        </p:nvSpPr>
+        <p:spPr>
+          <a:xfrm>
+            <a:off x="2002827" y="2816892"/>
+            <a:ext cx="884866" cy="343490"/>
+          </a:xfrm>
+          <a:prstGeom prst="downArrow">
+            <a:avLst>
+              <a:gd name="adj1" fmla="val 30083"/>
+              <a:gd name="adj2" fmla="val 56030"/>
+            </a:avLst>
+          </a:prstGeom>
+          <a:solidFill>
+            <a:schemeClr val="tx2">
+              <a:lumMod val="25000"/>
+              <a:lumOff val="75000"/>
+            </a:schemeClr>
+          </a:solidFill>
+        </p:spPr>
+        <p:style>
+          <a:lnRef idx="2">
+            <a:schemeClr val="accent1">
+              <a:shade val="15000"/>
+            </a:schemeClr>
+          </a:lnRef>
+          <a:fillRef idx="1">
+            <a:schemeClr val="accent1"/>
+          </a:fillRef>
+          <a:effectRef idx="0">
+            <a:schemeClr val="accent1"/>
+          </a:effectRef>
+          <a:fontRef idx="minor">
+            <a:schemeClr val="lt1"/>
+          </a:fontRef>
+        </p:style>
+        <p:txBody>
+          <a:bodyPr rtlCol="0" anchor="ctr"/>
+          <a:lstStyle/>
+          <a:p>
+            <a:pPr algn="ctr"/>
+            <a:endParaRPr lang="en-US"/>
+          </a:p>
+        </p:txBody>
+      </p:sp>
+      <p:sp>
+        <p:nvSpPr>
+          <p:cNvPr id="132" name="Down Arrow 131">
+            <a:extLst>
+              <a:ext uri="{FF2B5EF4-FFF2-40B4-BE49-F238E27FC236}">
+                <a16:creationId xmlns:a16="http://schemas.microsoft.com/office/drawing/2014/main" id="{9C0B1984-E76F-E8D5-CED1-A513BBCF31D7}"/>
+              </a:ext>
+            </a:extLst>
+          </p:cNvPr>
+          <p:cNvSpPr/>
+          <p:nvPr/>
+        </p:nvSpPr>
+        <p:spPr>
+          <a:xfrm>
+            <a:off x="3509092" y="2821759"/>
+            <a:ext cx="884866" cy="332420"/>
+          </a:xfrm>
+          <a:prstGeom prst="downArrow">
+            <a:avLst>
+              <a:gd name="adj1" fmla="val 30083"/>
+              <a:gd name="adj2" fmla="val 56030"/>
+            </a:avLst>
+          </a:prstGeom>
+          <a:solidFill>
+            <a:schemeClr val="tx2">
+              <a:lumMod val="25000"/>
+              <a:lumOff val="75000"/>
+            </a:schemeClr>
+          </a:solidFill>
+        </p:spPr>
+        <p:style>
+          <a:lnRef idx="2">
+            <a:schemeClr val="accent1">
+              <a:shade val="15000"/>
+            </a:schemeClr>
+          </a:lnRef>
+          <a:fillRef idx="1">
+            <a:schemeClr val="accent1"/>
+          </a:fillRef>
+          <a:effectRef idx="0">
+            <a:schemeClr val="accent1"/>
+          </a:effectRef>
+          <a:fontRef idx="minor">
+            <a:schemeClr val="lt1"/>
+          </a:fontRef>
+        </p:style>
+        <p:txBody>
+          <a:bodyPr rtlCol="0" anchor="ctr"/>
+          <a:lstStyle/>
+          <a:p>
+            <a:pPr algn="ctr"/>
+            <a:endParaRPr lang="en-US"/>
+          </a:p>
+        </p:txBody>
+      </p:sp>
+    </p:spTree>
+    <p:extLst>
+      <p:ext uri="{BB962C8B-B14F-4D97-AF65-F5344CB8AC3E}">
+        <p14:creationId xmlns:p14="http://schemas.microsoft.com/office/powerpoint/2010/main" val="4286875819"/>
+      </p:ext>
+    </p:extLst>
+  </p:cSld>
+  <p:clrMapOvr>
+    <a:masterClrMapping/>
+  </p:clrMapOvr>
+</p:sld>
+</file>
+
 <file path=ppt/theme/theme1.xml><?xml version="1.0" encoding="utf-8"?>
 <a:theme xmlns:a="http://schemas.openxmlformats.org/drawingml/2006/main" name="Office Theme">
   <a:themeElements>

</xml_diff>